<commit_message>
reclamos 03 01 text
</commit_message>
<xml_diff>
--- a/BancoNacion/documentos/Reclamos _03_01.pptx
+++ b/BancoNacion/documentos/Reclamos _03_01.pptx
@@ -121,8 +121,8 @@
 <pc:chgInfo xmlns:a="http://schemas.openxmlformats.org/drawingml/2006/main" xmlns:r="http://schemas.openxmlformats.org/officeDocument/2006/relationships" xmlns:ac="http://schemas.microsoft.com/office/drawing/2013/main/command" xmlns:pc="http://schemas.microsoft.com/office/powerpoint/2013/main/command">
   <pc:docChgLst>
     <pc:chgData name="John K. Barrera" userId="ff20ac3aac775278" providerId="LiveId" clId="{39C3E72C-4B84-452D-90F0-EB166C3B4D1D}"/>
-    <pc:docChg chg="delSld modSld">
-      <pc:chgData name="John K. Barrera" userId="ff20ac3aac775278" providerId="LiveId" clId="{39C3E72C-4B84-452D-90F0-EB166C3B4D1D}" dt="2022-03-02T03:09:13.211" v="19" actId="20577"/>
+    <pc:docChg chg="undo custSel delSld modSld">
+      <pc:chgData name="John K. Barrera" userId="ff20ac3aac775278" providerId="LiveId" clId="{39C3E72C-4B84-452D-90F0-EB166C3B4D1D}" dt="2022-03-02T14:08:09.768" v="47" actId="1035"/>
       <pc:docMkLst>
         <pc:docMk/>
       </pc:docMkLst>
@@ -191,6 +191,37 @@
         </pc:sldMkLst>
       </pc:sldChg>
       <pc:sldChg chg="modSp mod">
+        <pc:chgData name="John K. Barrera" userId="ff20ac3aac775278" providerId="LiveId" clId="{39C3E72C-4B84-452D-90F0-EB166C3B4D1D}" dt="2022-03-02T14:08:09.768" v="47" actId="1035"/>
+        <pc:sldMkLst>
+          <pc:docMk/>
+          <pc:sldMk cId="2191034399" sldId="382"/>
+        </pc:sldMkLst>
+        <pc:spChg chg="mod">
+          <ac:chgData name="John K. Barrera" userId="ff20ac3aac775278" providerId="LiveId" clId="{39C3E72C-4B84-452D-90F0-EB166C3B4D1D}" dt="2022-03-02T14:07:57.451" v="35" actId="20577"/>
+          <ac:spMkLst>
+            <pc:docMk/>
+            <pc:sldMk cId="2191034399" sldId="382"/>
+            <ac:spMk id="12" creationId="{002F249E-01CD-4A15-802F-2FC4DE855BEF}"/>
+          </ac:spMkLst>
+        </pc:spChg>
+        <pc:spChg chg="mod">
+          <ac:chgData name="John K. Barrera" userId="ff20ac3aac775278" providerId="LiveId" clId="{39C3E72C-4B84-452D-90F0-EB166C3B4D1D}" dt="2022-03-02T14:08:09.768" v="47" actId="1035"/>
+          <ac:spMkLst>
+            <pc:docMk/>
+            <pc:sldMk cId="2191034399" sldId="382"/>
+            <ac:spMk id="22" creationId="{C89DB2A0-1EF6-4E1F-8C52-F1B20078FA77}"/>
+          </ac:spMkLst>
+        </pc:spChg>
+        <pc:picChg chg="mod">
+          <ac:chgData name="John K. Barrera" userId="ff20ac3aac775278" providerId="LiveId" clId="{39C3E72C-4B84-452D-90F0-EB166C3B4D1D}" dt="2022-03-02T14:08:09.768" v="47" actId="1035"/>
+          <ac:picMkLst>
+            <pc:docMk/>
+            <pc:sldMk cId="2191034399" sldId="382"/>
+            <ac:picMk id="3078" creationId="{9AB9DC79-7B15-49F6-802C-2CB88241FD0F}"/>
+          </ac:picMkLst>
+        </pc:picChg>
+      </pc:sldChg>
+      <pc:sldChg chg="modSp mod">
         <pc:chgData name="John K. Barrera" userId="ff20ac3aac775278" providerId="LiveId" clId="{39C3E72C-4B84-452D-90F0-EB166C3B4D1D}" dt="2022-03-02T03:09:13.211" v="19" actId="20577"/>
         <pc:sldMkLst>
           <pc:docMk/>
@@ -1532,7 +1563,7 @@
           <a:p>
             <a:fld id="{4AA3995C-CEF4-46C5-822A-4E0ABA58EA45}" type="datetimeFigureOut">
               <a:rPr lang="en-US" smtClean="0"/>
-              <a:t>3/1/2022</a:t>
+              <a:t>3/2/2022</a:t>
             </a:fld>
             <a:endParaRPr lang="en-US"/>
           </a:p>
@@ -1986,7 +2017,7 @@
           <a:p>
             <a:fld id="{903304DD-1A9B-465F-A981-8B6D85F33039}" type="datetimeFigureOut">
               <a:rPr lang="en-US" smtClean="0"/>
-              <a:t>3/1/2022</a:t>
+              <a:t>3/2/2022</a:t>
             </a:fld>
             <a:endParaRPr lang="en-US"/>
           </a:p>
@@ -2289,7 +2320,7 @@
           <a:p>
             <a:fld id="{903304DD-1A9B-465F-A981-8B6D85F33039}" type="datetimeFigureOut">
               <a:rPr lang="en-US" smtClean="0"/>
-              <a:t>3/1/2022</a:t>
+              <a:t>3/2/2022</a:t>
             </a:fld>
             <a:endParaRPr lang="en-US"/>
           </a:p>
@@ -2459,7 +2490,7 @@
           <a:p>
             <a:fld id="{903304DD-1A9B-465F-A981-8B6D85F33039}" type="datetimeFigureOut">
               <a:rPr lang="en-US" smtClean="0"/>
-              <a:t>3/1/2022</a:t>
+              <a:t>3/2/2022</a:t>
             </a:fld>
             <a:endParaRPr lang="en-US"/>
           </a:p>
@@ -2639,7 +2670,7 @@
           <a:p>
             <a:fld id="{903304DD-1A9B-465F-A981-8B6D85F33039}" type="datetimeFigureOut">
               <a:rPr lang="en-US" smtClean="0"/>
-              <a:t>3/1/2022</a:t>
+              <a:t>3/2/2022</a:t>
             </a:fld>
             <a:endParaRPr lang="en-US"/>
           </a:p>
@@ -2873,7 +2904,7 @@
           <a:p>
             <a:fld id="{903304DD-1A9B-465F-A981-8B6D85F33039}" type="datetimeFigureOut">
               <a:rPr lang="en-US" smtClean="0"/>
-              <a:t>3/1/2022</a:t>
+              <a:t>3/2/2022</a:t>
             </a:fld>
             <a:endParaRPr lang="en-US"/>
           </a:p>
@@ -3071,7 +3102,7 @@
           <a:p>
             <a:fld id="{903304DD-1A9B-465F-A981-8B6D85F33039}" type="datetimeFigureOut">
               <a:rPr lang="en-US" smtClean="0"/>
-              <a:t>3/1/2022</a:t>
+              <a:t>3/2/2022</a:t>
             </a:fld>
             <a:endParaRPr lang="en-US"/>
           </a:p>
@@ -3317,7 +3348,7 @@
           <a:p>
             <a:fld id="{903304DD-1A9B-465F-A981-8B6D85F33039}" type="datetimeFigureOut">
               <a:rPr lang="en-US" smtClean="0"/>
-              <a:t>3/1/2022</a:t>
+              <a:t>3/2/2022</a:t>
             </a:fld>
             <a:endParaRPr lang="en-US"/>
           </a:p>
@@ -3549,7 +3580,7 @@
           <a:p>
             <a:fld id="{903304DD-1A9B-465F-A981-8B6D85F33039}" type="datetimeFigureOut">
               <a:rPr lang="en-US" smtClean="0"/>
-              <a:t>3/1/2022</a:t>
+              <a:t>3/2/2022</a:t>
             </a:fld>
             <a:endParaRPr lang="en-US"/>
           </a:p>
@@ -3916,7 +3947,7 @@
           <a:p>
             <a:fld id="{903304DD-1A9B-465F-A981-8B6D85F33039}" type="datetimeFigureOut">
               <a:rPr lang="en-US" smtClean="0"/>
-              <a:t>3/1/2022</a:t>
+              <a:t>3/2/2022</a:t>
             </a:fld>
             <a:endParaRPr lang="en-US"/>
           </a:p>
@@ -4034,7 +4065,7 @@
           <a:p>
             <a:fld id="{903304DD-1A9B-465F-A981-8B6D85F33039}" type="datetimeFigureOut">
               <a:rPr lang="en-US" smtClean="0"/>
-              <a:t>3/1/2022</a:t>
+              <a:t>3/2/2022</a:t>
             </a:fld>
             <a:endParaRPr lang="en-US"/>
           </a:p>
@@ -4129,7 +4160,7 @@
           <a:p>
             <a:fld id="{903304DD-1A9B-465F-A981-8B6D85F33039}" type="datetimeFigureOut">
               <a:rPr lang="en-US" smtClean="0"/>
-              <a:t>3/1/2022</a:t>
+              <a:t>3/2/2022</a:t>
             </a:fld>
             <a:endParaRPr lang="en-US"/>
           </a:p>
@@ -4406,7 +4437,7 @@
           <a:p>
             <a:fld id="{903304DD-1A9B-465F-A981-8B6D85F33039}" type="datetimeFigureOut">
               <a:rPr lang="en-US" smtClean="0"/>
-              <a:t>3/1/2022</a:t>
+              <a:t>3/2/2022</a:t>
             </a:fld>
             <a:endParaRPr lang="en-US"/>
           </a:p>
@@ -4619,7 +4650,7 @@
           <a:p>
             <a:fld id="{903304DD-1A9B-465F-A981-8B6D85F33039}" type="datetimeFigureOut">
               <a:rPr lang="en-US" smtClean="0"/>
-              <a:t>3/1/2022</a:t>
+              <a:t>3/2/2022</a:t>
             </a:fld>
             <a:endParaRPr lang="en-US"/>
           </a:p>
@@ -5527,7 +5558,7 @@
         <p:spPr>
           <a:xfrm>
             <a:off x="738222" y="866805"/>
-            <a:ext cx="10779861" cy="784790"/>
+            <a:ext cx="10779861" cy="1061789"/>
           </a:xfrm>
           <a:prstGeom prst="rect">
             <a:avLst/>
@@ -5552,34 +5583,14 @@
               </a:spcAft>
             </a:pPr>
             <a:r>
-              <a:rPr lang="es-PE" altLang="es-PE" dirty="0">
+              <a:rPr lang="es-MX" altLang="es-PE" dirty="0">
                 <a:solidFill>
                   <a:srgbClr val="000000"/>
                 </a:solidFill>
                 <a:latin typeface="Calibri" panose="020F0502020204030204" pitchFamily="34" charset="0"/>
                 <a:cs typeface="Calibri" panose="020F0502020204030204" pitchFamily="34" charset="0"/>
               </a:rPr>
-              <a:t>Después de hacer un análisis descriptivo de los datos preprocesados, y con el </a:t>
-            </a:r>
-            <a:r>
-              <a:rPr lang="es-PE" altLang="es-PE" i="1" dirty="0" err="1">
-                <a:solidFill>
-                  <a:srgbClr val="000000"/>
-                </a:solidFill>
-                <a:latin typeface="Calibri" panose="020F0502020204030204" pitchFamily="34" charset="0"/>
-                <a:cs typeface="Calibri" panose="020F0502020204030204" pitchFamily="34" charset="0"/>
-              </a:rPr>
-              <a:t>feedback</a:t>
-            </a:r>
-            <a:r>
-              <a:rPr lang="es-PE" altLang="es-PE" dirty="0">
-                <a:solidFill>
-                  <a:srgbClr val="000000"/>
-                </a:solidFill>
-                <a:latin typeface="Calibri" panose="020F0502020204030204" pitchFamily="34" charset="0"/>
-                <a:cs typeface="Calibri" panose="020F0502020204030204" pitchFamily="34" charset="0"/>
-              </a:rPr>
-              <a:t> de Negocio, hemos seleccionado un servicio piloto para ejecutar el modelo. </a:t>
+              <a:t>En base a las conversaciones con negocio, se llego al acuerdo de enfocar el proyecto a la respuesta de reclamos de servicio de </a:t>
             </a:r>
             <a:r>
               <a:rPr lang="es-PE" altLang="es-PE" b="1" dirty="0">
@@ -5589,7 +5600,17 @@
                 <a:latin typeface="Calibri" panose="020F0502020204030204" pitchFamily="34" charset="0"/>
                 <a:cs typeface="Calibri" panose="020F0502020204030204" pitchFamily="34" charset="0"/>
               </a:rPr>
-              <a:t>Atención al usuario (*)</a:t>
+              <a:t>Atención al usuario (*) </a:t>
+            </a:r>
+            <a:r>
+              <a:rPr lang="es-MX" altLang="es-PE" dirty="0">
+                <a:solidFill>
+                  <a:srgbClr val="000000"/>
+                </a:solidFill>
+                <a:latin typeface="Calibri" panose="020F0502020204030204" pitchFamily="34" charset="0"/>
+                <a:cs typeface="Calibri" panose="020F0502020204030204" pitchFamily="34" charset="0"/>
+              </a:rPr>
+              <a:t>, ya que son reclamos que se pueden completar en automático y representan el 15% del volumen total.</a:t>
             </a:r>
             <a:endParaRPr lang="es-PE" altLang="es-PE" dirty="0">
               <a:solidFill>
@@ -5735,7 +5756,7 @@
         </p:nvSpPr>
         <p:spPr>
           <a:xfrm>
-            <a:off x="3641885" y="1716016"/>
+            <a:off x="3641885" y="1905796"/>
             <a:ext cx="4908228" cy="492402"/>
           </a:xfrm>
           <a:prstGeom prst="rect">
@@ -5848,7 +5869,7 @@
         </p:blipFill>
         <p:spPr bwMode="auto">
           <a:xfrm>
-            <a:off x="1662112" y="2147215"/>
+            <a:off x="1662112" y="2336995"/>
             <a:ext cx="8867775" cy="3933825"/>
           </a:xfrm>
           <a:prstGeom prst="rect">

</xml_diff>